<commit_message>
update code & ppt of Fisherfaces
</commit_message>
<xml_diff>
--- a/ppt/Fisheraces.pptx
+++ b/ppt/Fisheraces.pptx
@@ -5,7 +5,7 @@
     <p:sldMasterId id="2147483648" r:id="rId1"/>
   </p:sldMasterIdLst>
   <p:notesMasterIdLst>
-    <p:notesMasterId r:id="rId15"/>
+    <p:notesMasterId r:id="rId16"/>
   </p:notesMasterIdLst>
   <p:sldIdLst>
     <p:sldId id="256" r:id="rId2"/>
@@ -21,6 +21,7 @@
     <p:sldId id="266" r:id="rId12"/>
     <p:sldId id="267" r:id="rId13"/>
     <p:sldId id="268" r:id="rId14"/>
+    <p:sldId id="269" r:id="rId15"/>
   </p:sldIdLst>
   <p:sldSz cx="12192000" cy="6858000"/>
   <p:notesSz cx="6858000" cy="9144000"/>
@@ -209,7 +210,7 @@
           <a:p>
             <a:fld id="{934076B7-34E0-43CF-9114-0EFC793822DB}" type="datetimeFigureOut">
               <a:rPr lang="zh-CN" altLang="en-US" smtClean="0"/>
-              <a:t>2020/5/13</a:t>
+              <a:t>2020/6/2</a:t>
             </a:fld>
             <a:endParaRPr lang="zh-CN" altLang="en-US"/>
           </a:p>
@@ -521,57 +522,6 @@
           <a:bodyPr/>
           <a:lstStyle/>
           <a:p>
-            <a:r>
-              <a:rPr lang="en-US" altLang="zh-CN" sz="1200" b="0" i="0" kern="1200" dirty="0" smtClean="0">
-                <a:solidFill>
-                  <a:schemeClr val="tx1"/>
-                </a:solidFill>
-                <a:effectLst/>
-                <a:latin typeface="+mn-lt"/>
-                <a:ea typeface="+mn-ea"/>
-                <a:cs typeface="+mn-cs"/>
-              </a:rPr>
-              <a:t>PCA</a:t>
-            </a:r>
-            <a:r>
-              <a:rPr lang="zh-CN" altLang="en-US" sz="1200" b="0" i="0" kern="1200" dirty="0" smtClean="0">
-                <a:solidFill>
-                  <a:schemeClr val="tx1"/>
-                </a:solidFill>
-                <a:effectLst/>
-                <a:latin typeface="+mn-lt"/>
-                <a:ea typeface="+mn-ea"/>
-                <a:cs typeface="+mn-cs"/>
-              </a:rPr>
-              <a:t>是不考虑样本类别输出的无监督学习方法</a:t>
-            </a:r>
-            <a:endParaRPr lang="en-US" altLang="zh-CN" sz="1200" b="0" i="0" kern="1200" dirty="0" smtClean="0">
-              <a:solidFill>
-                <a:schemeClr val="tx1"/>
-              </a:solidFill>
-              <a:effectLst/>
-              <a:latin typeface="+mn-lt"/>
-              <a:ea typeface="+mn-ea"/>
-              <a:cs typeface="+mn-cs"/>
-            </a:endParaRPr>
-          </a:p>
-          <a:p>
-            <a:r>
-              <a:rPr lang="zh-CN" altLang="en-US" dirty="0" smtClean="0"/>
-              <a:t>二维数据投影到一维，</a:t>
-            </a:r>
-            <a:r>
-              <a:rPr lang="zh-CN" altLang="en-US" sz="1200" b="0" i="0" kern="1200" dirty="0" smtClean="0">
-                <a:solidFill>
-                  <a:schemeClr val="tx1"/>
-                </a:solidFill>
-                <a:effectLst/>
-                <a:latin typeface="+mn-lt"/>
-                <a:ea typeface="+mn-ea"/>
-                <a:cs typeface="+mn-cs"/>
-              </a:rPr>
-              <a:t>右图能够更好地满足目标。</a:t>
-            </a:r>
             <a:endParaRPr lang="zh-CN" altLang="en-US" dirty="0"/>
           </a:p>
         </p:txBody>
@@ -593,7 +543,7 @@
           <a:p>
             <a:fld id="{1906FC78-C534-4F70-9640-0A9AE9E900C6}" type="slidenum">
               <a:rPr lang="zh-CN" altLang="en-US" smtClean="0"/>
-              <a:t>2</a:t>
+              <a:t>1</a:t>
             </a:fld>
             <a:endParaRPr lang="zh-CN" altLang="en-US"/>
           </a:p>
@@ -602,7 +552,7 @@
     </p:spTree>
     <p:extLst>
       <p:ext uri="{BB962C8B-B14F-4D97-AF65-F5344CB8AC3E}">
-        <p14:creationId xmlns:p14="http://schemas.microsoft.com/office/powerpoint/2010/main" val="2010773007"/>
+        <p14:creationId xmlns:p14="http://schemas.microsoft.com/office/powerpoint/2010/main" val="481240080"/>
       </p:ext>
     </p:extLst>
   </p:cSld>
@@ -641,29 +591,141 @@
         </p:nvSpPr>
         <p:spPr/>
       </p:sp>
-      <p:sp>
-        <p:nvSpPr>
-          <p:cNvPr id="3" name="备注占位符 2"/>
-          <p:cNvSpPr>
-            <a:spLocks noGrp="1"/>
-          </p:cNvSpPr>
-          <p:nvPr>
-            <p:ph type="body" idx="1"/>
-          </p:nvPr>
-        </p:nvSpPr>
-        <p:spPr/>
-        <p:txBody>
-          <a:bodyPr/>
-          <a:lstStyle/>
-          <a:p>
-            <a:r>
-              <a:rPr lang="zh-CN" altLang="en-US" dirty="0" smtClean="0"/>
-              <a:t>秩等于非零特征值个数</a:t>
-            </a:r>
-            <a:endParaRPr lang="zh-CN" altLang="en-US" dirty="0"/>
-          </a:p>
-        </p:txBody>
-      </p:sp>
+      <mc:AlternateContent xmlns:mc="http://schemas.openxmlformats.org/markup-compatibility/2006" xmlns:a14="http://schemas.microsoft.com/office/drawing/2010/main">
+        <mc:Choice Requires="a14">
+          <p:sp>
+            <p:nvSpPr>
+              <p:cNvPr id="3" name="备注占位符 2"/>
+              <p:cNvSpPr>
+                <a:spLocks noGrp="1"/>
+              </p:cNvSpPr>
+              <p:nvPr>
+                <p:ph type="body" idx="1"/>
+              </p:nvPr>
+            </p:nvSpPr>
+            <p:spPr/>
+            <p:txBody>
+              <a:bodyPr/>
+              <a:lstStyle/>
+              <a:p>
+                <a:r>
+                  <a:rPr lang="zh-CN" altLang="en-US" dirty="0" smtClean="0"/>
+                  <a:t>最终得到</a:t>
+                </a:r>
+                <a14:m>
+                  <m:oMath xmlns:m="http://schemas.openxmlformats.org/officeDocument/2006/math">
+                    <m:sSubSup>
+                      <m:sSubSupPr>
+                        <m:ctrlPr>
+                          <a:rPr lang="en-US" altLang="zh-CN" i="1" smtClean="0">
+                            <a:latin typeface="Cambria Math" panose="02040503050406030204" pitchFamily="18" charset="0"/>
+                          </a:rPr>
+                        </m:ctrlPr>
+                      </m:sSubSupPr>
+                      <m:e>
+                        <m:r>
+                          <m:rPr>
+                            <m:sty m:val="p"/>
+                          </m:rPr>
+                          <a:rPr lang="en-US" altLang="zh-CN" i="1">
+                            <a:latin typeface="Cambria Math" panose="02040503050406030204" pitchFamily="18" charset="0"/>
+                          </a:rPr>
+                          <m:t>W</m:t>
+                        </m:r>
+                      </m:e>
+                      <m:sub>
+                        <m:r>
+                          <m:rPr>
+                            <m:sty m:val="p"/>
+                          </m:rPr>
+                          <a:rPr lang="en-US" altLang="zh-CN" i="1">
+                            <a:latin typeface="Cambria Math" panose="02040503050406030204" pitchFamily="18" charset="0"/>
+                          </a:rPr>
+                          <m:t>opt</m:t>
+                        </m:r>
+                      </m:sub>
+                      <m:sup>
+                        <m:r>
+                          <a:rPr lang="en-US" altLang="zh-CN" i="1">
+                            <a:latin typeface="Cambria Math" panose="02040503050406030204" pitchFamily="18" charset="0"/>
+                          </a:rPr>
+                          <m:t>𝑇</m:t>
+                        </m:r>
+                      </m:sup>
+                    </m:sSubSup>
+                  </m:oMath>
+                </a14:m>
+                <a:endParaRPr lang="en-US" altLang="zh-CN" dirty="0" smtClean="0"/>
+              </a:p>
+              <a:p>
+                <a:r>
+                  <a:rPr lang="en-US" altLang="zh-CN" dirty="0" smtClean="0"/>
+                  <a:t>n</a:t>
+                </a:r>
+                <a:r>
+                  <a:rPr lang="en-US" altLang="zh-CN" baseline="0" dirty="0" smtClean="0"/>
+                  <a:t> to N-c to c-1</a:t>
+                </a:r>
+                <a:endParaRPr lang="zh-CN" altLang="en-US" dirty="0"/>
+              </a:p>
+            </p:txBody>
+          </p:sp>
+        </mc:Choice>
+        <mc:Fallback xmlns="">
+          <p:sp>
+            <p:nvSpPr>
+              <p:cNvPr id="3" name="备注占位符 2"/>
+              <p:cNvSpPr>
+                <a:spLocks noGrp="1"/>
+              </p:cNvSpPr>
+              <p:nvPr>
+                <p:ph type="body" idx="1"/>
+              </p:nvPr>
+            </p:nvSpPr>
+            <p:spPr/>
+            <p:txBody>
+              <a:bodyPr/>
+              <a:lstStyle/>
+              <a:p>
+                <a:r>
+                  <a:rPr lang="zh-CN" altLang="en-US" dirty="0" smtClean="0"/>
+                  <a:t>最终得到</a:t>
+                </a:r>
+                <a:r>
+                  <a:rPr lang="en-US" altLang="zh-CN" i="0">
+                    <a:latin typeface="Cambria Math" panose="02040503050406030204" pitchFamily="18" charset="0"/>
+                  </a:rPr>
+                  <a:t>W</a:t>
+                </a:r>
+                <a:r>
+                  <a:rPr lang="en-US" altLang="zh-CN" i="0" smtClean="0">
+                    <a:latin typeface="Cambria Math" panose="02040503050406030204" pitchFamily="18" charset="0"/>
+                  </a:rPr>
+                  <a:t>_</a:t>
+                </a:r>
+                <a:r>
+                  <a:rPr lang="en-US" altLang="zh-CN" i="0">
+                    <a:latin typeface="Cambria Math" panose="02040503050406030204" pitchFamily="18" charset="0"/>
+                  </a:rPr>
+                  <a:t>opt^𝑇</a:t>
+                </a:r>
+                <a:endParaRPr lang="en-US" altLang="zh-CN" dirty="0" smtClean="0"/>
+              </a:p>
+              <a:p>
+                <a:r>
+                  <a:rPr lang="en-US" altLang="zh-CN" dirty="0" smtClean="0"/>
+                  <a:t>n</a:t>
+                </a:r>
+                <a:r>
+                  <a:rPr lang="en-US" altLang="zh-CN" baseline="0" dirty="0" smtClean="0"/>
+                  <a:t> to N-c to c-1</a:t>
+                </a:r>
+                <a:endParaRPr lang="zh-CN" altLang="en-US" dirty="0"/>
+              </a:p>
+            </p:txBody>
+          </p:sp>
+        </mc:Fallback>
+      </mc:AlternateContent>
       <p:sp>
         <p:nvSpPr>
           <p:cNvPr id="4" name="灯片编号占位符 3"/>
@@ -681,7 +743,7 @@
           <a:p>
             <a:fld id="{1906FC78-C534-4F70-9640-0A9AE9E900C6}" type="slidenum">
               <a:rPr lang="zh-CN" altLang="en-US" smtClean="0"/>
-              <a:t>11</a:t>
+              <a:t>10</a:t>
             </a:fld>
             <a:endParaRPr lang="zh-CN" altLang="en-US"/>
           </a:p>
@@ -690,7 +752,7 @@
     </p:spTree>
     <p:extLst>
       <p:ext uri="{BB962C8B-B14F-4D97-AF65-F5344CB8AC3E}">
-        <p14:creationId xmlns:p14="http://schemas.microsoft.com/office/powerpoint/2010/main" val="3980859659"/>
+        <p14:creationId xmlns:p14="http://schemas.microsoft.com/office/powerpoint/2010/main" val="3725770565"/>
       </p:ext>
     </p:extLst>
   </p:cSld>
@@ -746,37 +808,8 @@
           <a:p>
             <a:r>
               <a:rPr lang="zh-CN" altLang="en-US" dirty="0" smtClean="0"/>
-              <a:t>散度就是点的分散程度</a:t>
+              <a:t>秩等于非零特征值个数</a:t>
             </a:r>
-            <a:endParaRPr lang="en-US" altLang="zh-CN" dirty="0" smtClean="0"/>
-          </a:p>
-          <a:p>
-            <a:r>
-              <a:rPr lang="en-US" altLang="zh-CN" dirty="0" smtClean="0"/>
-              <a:t>PCA</a:t>
-            </a:r>
-            <a:r>
-              <a:rPr lang="zh-CN" altLang="en-US" dirty="0" smtClean="0"/>
-              <a:t>投影后的点，不同类可能仍然混在一起，无法分类</a:t>
-            </a:r>
-            <a:endParaRPr lang="en-US" altLang="zh-CN" dirty="0" smtClean="0"/>
-          </a:p>
-          <a:p>
-            <a:r>
-              <a:rPr lang="zh-CN" altLang="en-US" dirty="0" smtClean="0"/>
-              <a:t>人脸识别就是分类问题，所以从理论上看，</a:t>
-            </a:r>
-            <a:r>
-              <a:rPr lang="en-US" altLang="zh-CN" dirty="0" smtClean="0"/>
-              <a:t>FLD</a:t>
-            </a:r>
-            <a:r>
-              <a:rPr lang="zh-CN" altLang="en-US" dirty="0" smtClean="0"/>
-              <a:t>方法更优。</a:t>
-            </a:r>
-            <a:endParaRPr lang="en-US" altLang="zh-CN" dirty="0" smtClean="0"/>
-          </a:p>
-          <a:p>
             <a:endParaRPr lang="zh-CN" altLang="en-US" dirty="0"/>
           </a:p>
         </p:txBody>
@@ -798,6 +831,123 @@
           <a:p>
             <a:fld id="{1906FC78-C534-4F70-9640-0A9AE9E900C6}" type="slidenum">
               <a:rPr lang="zh-CN" altLang="en-US" smtClean="0"/>
+              <a:t>11</a:t>
+            </a:fld>
+            <a:endParaRPr lang="zh-CN" altLang="en-US"/>
+          </a:p>
+        </p:txBody>
+      </p:sp>
+    </p:spTree>
+    <p:extLst>
+      <p:ext uri="{BB962C8B-B14F-4D97-AF65-F5344CB8AC3E}">
+        <p14:creationId xmlns:p14="http://schemas.microsoft.com/office/powerpoint/2010/main" val="3980859659"/>
+      </p:ext>
+    </p:extLst>
+  </p:cSld>
+  <p:clrMapOvr>
+    <a:masterClrMapping/>
+  </p:clrMapOvr>
+</p:notes>
+</file>
+
+<file path=ppt/notesSlides/notesSlide12.xml><?xml version="1.0" encoding="utf-8"?>
+<p:notes xmlns:a="http://schemas.openxmlformats.org/drawingml/2006/main" xmlns:r="http://schemas.openxmlformats.org/officeDocument/2006/relationships" xmlns:p="http://schemas.openxmlformats.org/presentationml/2006/main">
+  <p:cSld>
+    <p:spTree>
+      <p:nvGrpSpPr>
+        <p:cNvPr id="1" name=""/>
+        <p:cNvGrpSpPr/>
+        <p:nvPr/>
+      </p:nvGrpSpPr>
+      <p:grpSpPr>
+        <a:xfrm>
+          <a:off x="0" y="0"/>
+          <a:ext cx="0" cy="0"/>
+          <a:chOff x="0" y="0"/>
+          <a:chExt cx="0" cy="0"/>
+        </a:xfrm>
+      </p:grpSpPr>
+      <p:sp>
+        <p:nvSpPr>
+          <p:cNvPr id="2" name="幻灯片图像占位符 1"/>
+          <p:cNvSpPr>
+            <a:spLocks noGrp="1" noRot="1" noChangeAspect="1"/>
+          </p:cNvSpPr>
+          <p:nvPr>
+            <p:ph type="sldImg"/>
+          </p:nvPr>
+        </p:nvSpPr>
+        <p:spPr/>
+      </p:sp>
+      <p:sp>
+        <p:nvSpPr>
+          <p:cNvPr id="3" name="备注占位符 2"/>
+          <p:cNvSpPr>
+            <a:spLocks noGrp="1"/>
+          </p:cNvSpPr>
+          <p:nvPr>
+            <p:ph type="body" idx="1"/>
+          </p:nvPr>
+        </p:nvSpPr>
+        <p:spPr/>
+        <p:txBody>
+          <a:bodyPr/>
+          <a:lstStyle/>
+          <a:p>
+            <a:r>
+              <a:rPr lang="zh-CN" altLang="en-US" dirty="0" smtClean="0"/>
+              <a:t>散度就是点的分散程度</a:t>
+            </a:r>
+            <a:endParaRPr lang="en-US" altLang="zh-CN" dirty="0" smtClean="0"/>
+          </a:p>
+          <a:p>
+            <a:r>
+              <a:rPr lang="en-US" altLang="zh-CN" dirty="0" smtClean="0"/>
+              <a:t>PCA</a:t>
+            </a:r>
+            <a:r>
+              <a:rPr lang="zh-CN" altLang="en-US" dirty="0" smtClean="0"/>
+              <a:t>投影后的点，不同类可能仍然混在一起，无法分类</a:t>
+            </a:r>
+            <a:endParaRPr lang="en-US" altLang="zh-CN" dirty="0" smtClean="0"/>
+          </a:p>
+          <a:p>
+            <a:r>
+              <a:rPr lang="zh-CN" altLang="en-US" dirty="0" smtClean="0"/>
+              <a:t>人脸识别就是分类问题，所以从理论上看，</a:t>
+            </a:r>
+            <a:r>
+              <a:rPr lang="en-US" altLang="zh-CN" dirty="0" smtClean="0"/>
+              <a:t>FLD</a:t>
+            </a:r>
+            <a:r>
+              <a:rPr lang="zh-CN" altLang="en-US" dirty="0" smtClean="0"/>
+              <a:t>方法更优。</a:t>
+            </a:r>
+            <a:endParaRPr lang="en-US" altLang="zh-CN" dirty="0" smtClean="0"/>
+          </a:p>
+          <a:p>
+            <a:endParaRPr lang="zh-CN" altLang="en-US" dirty="0"/>
+          </a:p>
+        </p:txBody>
+      </p:sp>
+      <p:sp>
+        <p:nvSpPr>
+          <p:cNvPr id="4" name="灯片编号占位符 3"/>
+          <p:cNvSpPr>
+            <a:spLocks noGrp="1"/>
+          </p:cNvSpPr>
+          <p:nvPr>
+            <p:ph type="sldNum" sz="quarter" idx="10"/>
+          </p:nvPr>
+        </p:nvSpPr>
+        <p:spPr/>
+        <p:txBody>
+          <a:bodyPr/>
+          <a:lstStyle/>
+          <a:p>
+            <a:fld id="{1906FC78-C534-4F70-9640-0A9AE9E900C6}" type="slidenum">
+              <a:rPr lang="zh-CN" altLang="en-US" smtClean="0"/>
               <a:t>12</a:t>
             </a:fld>
             <a:endParaRPr lang="zh-CN" altLang="en-US"/>
@@ -808,6 +958,239 @@
     <p:extLst>
       <p:ext uri="{BB962C8B-B14F-4D97-AF65-F5344CB8AC3E}">
         <p14:creationId xmlns:p14="http://schemas.microsoft.com/office/powerpoint/2010/main" val="573531815"/>
+      </p:ext>
+    </p:extLst>
+  </p:cSld>
+  <p:clrMapOvr>
+    <a:masterClrMapping/>
+  </p:clrMapOvr>
+</p:notes>
+</file>
+
+<file path=ppt/notesSlides/notesSlide13.xml><?xml version="1.0" encoding="utf-8"?>
+<p:notes xmlns:a="http://schemas.openxmlformats.org/drawingml/2006/main" xmlns:r="http://schemas.openxmlformats.org/officeDocument/2006/relationships" xmlns:p="http://schemas.openxmlformats.org/presentationml/2006/main">
+  <p:cSld>
+    <p:spTree>
+      <p:nvGrpSpPr>
+        <p:cNvPr id="1" name=""/>
+        <p:cNvGrpSpPr/>
+        <p:nvPr/>
+      </p:nvGrpSpPr>
+      <p:grpSpPr>
+        <a:xfrm>
+          <a:off x="0" y="0"/>
+          <a:ext cx="0" cy="0"/>
+          <a:chOff x="0" y="0"/>
+          <a:chExt cx="0" cy="0"/>
+        </a:xfrm>
+      </p:grpSpPr>
+      <p:sp>
+        <p:nvSpPr>
+          <p:cNvPr id="2" name="幻灯片图像占位符 1"/>
+          <p:cNvSpPr>
+            <a:spLocks noGrp="1" noRot="1" noChangeAspect="1"/>
+          </p:cNvSpPr>
+          <p:nvPr>
+            <p:ph type="sldImg"/>
+          </p:nvPr>
+        </p:nvSpPr>
+        <p:spPr/>
+      </p:sp>
+      <p:sp>
+        <p:nvSpPr>
+          <p:cNvPr id="3" name="备注占位符 2"/>
+          <p:cNvSpPr>
+            <a:spLocks noGrp="1"/>
+          </p:cNvSpPr>
+          <p:nvPr>
+            <p:ph type="body" idx="1"/>
+          </p:nvPr>
+        </p:nvSpPr>
+        <p:spPr/>
+        <p:txBody>
+          <a:bodyPr/>
+          <a:lstStyle/>
+          <a:p>
+            <a:r>
+              <a:rPr lang="zh-CN" altLang="en-US" dirty="0" smtClean="0"/>
+              <a:t>留一法：每次挑选一张作为测试集，其余作为训练集（</a:t>
+            </a:r>
+            <a:r>
+              <a:rPr lang="en-US" altLang="zh-CN" dirty="0" smtClean="0"/>
+              <a:t>164</a:t>
+            </a:r>
+            <a:r>
+              <a:rPr lang="zh-CN" altLang="en-US" dirty="0" smtClean="0"/>
+              <a:t>张），</a:t>
+            </a:r>
+            <a:endParaRPr lang="en-US" altLang="zh-CN" dirty="0" smtClean="0"/>
+          </a:p>
+          <a:p>
+            <a:r>
+              <a:rPr lang="zh-CN" altLang="en-US" dirty="0" smtClean="0"/>
+              <a:t>每次得到一个模型（</a:t>
+            </a:r>
+            <a:r>
+              <a:rPr lang="en-US" altLang="zh-CN" dirty="0" smtClean="0"/>
+              <a:t>165</a:t>
+            </a:r>
+            <a:r>
+              <a:rPr lang="zh-CN" altLang="en-US" dirty="0" smtClean="0"/>
+              <a:t>个），一个结果（），用所有模型的平均结果作为衡量性能标准。</a:t>
+            </a:r>
+            <a:endParaRPr lang="en-US" altLang="zh-CN" dirty="0" smtClean="0"/>
+          </a:p>
+          <a:p>
+            <a:r>
+              <a:rPr lang="en-US" altLang="zh-CN" dirty="0" smtClean="0"/>
+              <a:t>C=15 N=165</a:t>
+            </a:r>
+          </a:p>
+          <a:p>
+            <a:r>
+              <a:rPr lang="zh-CN" altLang="en-US" dirty="0" smtClean="0"/>
+              <a:t>准确率：正确识别分类人脸的比率</a:t>
+            </a:r>
+            <a:endParaRPr lang="en-US" altLang="zh-CN" dirty="0" smtClean="0"/>
+          </a:p>
+          <a:p>
+            <a:r>
+              <a:rPr lang="en-US" altLang="zh-CN" dirty="0" smtClean="0"/>
+              <a:t>N-1-c = 164-15=149 </a:t>
+            </a:r>
+            <a:r>
+              <a:rPr lang="zh-CN" altLang="en-US" dirty="0" smtClean="0"/>
+              <a:t>仍有共线性，即明显奇异的问题</a:t>
+            </a:r>
+            <a:endParaRPr lang="en-US" altLang="zh-CN" dirty="0" smtClean="0"/>
+          </a:p>
+          <a:p>
+            <a:r>
+              <a:rPr lang="zh-CN" altLang="en-US" dirty="0" smtClean="0"/>
+              <a:t>从某维开始下降，接近出现了奇异问题</a:t>
+            </a:r>
+            <a:endParaRPr lang="en-US" altLang="zh-CN" dirty="0" smtClean="0"/>
+          </a:p>
+          <a:p>
+            <a:r>
+              <a:rPr lang="zh-CN" altLang="en-US" dirty="0" smtClean="0"/>
+              <a:t>但准确率都非常高</a:t>
+            </a:r>
+            <a:endParaRPr lang="zh-CN" altLang="en-US" dirty="0"/>
+          </a:p>
+        </p:txBody>
+      </p:sp>
+      <p:sp>
+        <p:nvSpPr>
+          <p:cNvPr id="4" name="灯片编号占位符 3"/>
+          <p:cNvSpPr>
+            <a:spLocks noGrp="1"/>
+          </p:cNvSpPr>
+          <p:nvPr>
+            <p:ph type="sldNum" sz="quarter" idx="10"/>
+          </p:nvPr>
+        </p:nvSpPr>
+        <p:spPr/>
+        <p:txBody>
+          <a:bodyPr/>
+          <a:lstStyle/>
+          <a:p>
+            <a:fld id="{1906FC78-C534-4F70-9640-0A9AE9E900C6}" type="slidenum">
+              <a:rPr lang="zh-CN" altLang="en-US" smtClean="0"/>
+              <a:t>13</a:t>
+            </a:fld>
+            <a:endParaRPr lang="zh-CN" altLang="en-US"/>
+          </a:p>
+        </p:txBody>
+      </p:sp>
+    </p:spTree>
+    <p:extLst>
+      <p:ext uri="{BB962C8B-B14F-4D97-AF65-F5344CB8AC3E}">
+        <p14:creationId xmlns:p14="http://schemas.microsoft.com/office/powerpoint/2010/main" val="3243496583"/>
+      </p:ext>
+    </p:extLst>
+  </p:cSld>
+  <p:clrMapOvr>
+    <a:masterClrMapping/>
+  </p:clrMapOvr>
+</p:notes>
+</file>
+
+<file path=ppt/notesSlides/notesSlide14.xml><?xml version="1.0" encoding="utf-8"?>
+<p:notes xmlns:a="http://schemas.openxmlformats.org/drawingml/2006/main" xmlns:r="http://schemas.openxmlformats.org/officeDocument/2006/relationships" xmlns:p="http://schemas.openxmlformats.org/presentationml/2006/main">
+  <p:cSld>
+    <p:spTree>
+      <p:nvGrpSpPr>
+        <p:cNvPr id="1" name=""/>
+        <p:cNvGrpSpPr/>
+        <p:nvPr/>
+      </p:nvGrpSpPr>
+      <p:grpSpPr>
+        <a:xfrm>
+          <a:off x="0" y="0"/>
+          <a:ext cx="0" cy="0"/>
+          <a:chOff x="0" y="0"/>
+          <a:chExt cx="0" cy="0"/>
+        </a:xfrm>
+      </p:grpSpPr>
+      <p:sp>
+        <p:nvSpPr>
+          <p:cNvPr id="2" name="幻灯片图像占位符 1"/>
+          <p:cNvSpPr>
+            <a:spLocks noGrp="1" noRot="1" noChangeAspect="1"/>
+          </p:cNvSpPr>
+          <p:nvPr>
+            <p:ph type="sldImg"/>
+          </p:nvPr>
+        </p:nvSpPr>
+        <p:spPr/>
+      </p:sp>
+      <p:sp>
+        <p:nvSpPr>
+          <p:cNvPr id="3" name="备注占位符 2"/>
+          <p:cNvSpPr>
+            <a:spLocks noGrp="1"/>
+          </p:cNvSpPr>
+          <p:nvPr>
+            <p:ph type="body" idx="1"/>
+          </p:nvPr>
+        </p:nvSpPr>
+        <p:spPr/>
+        <p:txBody>
+          <a:bodyPr/>
+          <a:lstStyle/>
+          <a:p>
+            <a:endParaRPr lang="zh-CN" altLang="en-US" dirty="0"/>
+          </a:p>
+        </p:txBody>
+      </p:sp>
+      <p:sp>
+        <p:nvSpPr>
+          <p:cNvPr id="4" name="灯片编号占位符 3"/>
+          <p:cNvSpPr>
+            <a:spLocks noGrp="1"/>
+          </p:cNvSpPr>
+          <p:nvPr>
+            <p:ph type="sldNum" sz="quarter" idx="10"/>
+          </p:nvPr>
+        </p:nvSpPr>
+        <p:spPr/>
+        <p:txBody>
+          <a:bodyPr/>
+          <a:lstStyle/>
+          <a:p>
+            <a:fld id="{1906FC78-C534-4F70-9640-0A9AE9E900C6}" type="slidenum">
+              <a:rPr lang="zh-CN" altLang="en-US" smtClean="0"/>
+              <a:t>14</a:t>
+            </a:fld>
+            <a:endParaRPr lang="zh-CN" altLang="en-US"/>
+          </a:p>
+        </p:txBody>
+      </p:sp>
+    </p:spTree>
+    <p:extLst>
+      <p:ext uri="{BB962C8B-B14F-4D97-AF65-F5344CB8AC3E}">
+        <p14:creationId xmlns:p14="http://schemas.microsoft.com/office/powerpoint/2010/main" val="1210729292"/>
       </p:ext>
     </p:extLst>
   </p:cSld>
@@ -862,10 +1245,57 @@
           <a:lstStyle/>
           <a:p>
             <a:r>
+              <a:rPr lang="en-US" altLang="zh-CN" sz="1200" b="0" i="0" kern="1200" dirty="0" smtClean="0">
+                <a:solidFill>
+                  <a:schemeClr val="tx1"/>
+                </a:solidFill>
+                <a:effectLst/>
+                <a:latin typeface="+mn-lt"/>
+                <a:ea typeface="+mn-ea"/>
+                <a:cs typeface="+mn-cs"/>
+              </a:rPr>
+              <a:t>PCA</a:t>
+            </a:r>
+            <a:r>
+              <a:rPr lang="zh-CN" altLang="en-US" sz="1200" b="0" i="0" kern="1200" dirty="0" smtClean="0">
+                <a:solidFill>
+                  <a:schemeClr val="tx1"/>
+                </a:solidFill>
+                <a:effectLst/>
+                <a:latin typeface="+mn-lt"/>
+                <a:ea typeface="+mn-ea"/>
+                <a:cs typeface="+mn-cs"/>
+              </a:rPr>
+              <a:t>是不考虑样本类别输出的无监督学习方法</a:t>
+            </a:r>
+            <a:endParaRPr lang="en-US" altLang="zh-CN" sz="1200" b="0" i="0" kern="1200" dirty="0" smtClean="0">
+              <a:solidFill>
+                <a:schemeClr val="tx1"/>
+              </a:solidFill>
+              <a:effectLst/>
+              <a:latin typeface="+mn-lt"/>
+              <a:ea typeface="+mn-ea"/>
+              <a:cs typeface="+mn-cs"/>
+            </a:endParaRPr>
+          </a:p>
+          <a:p>
+            <a:r>
               <a:rPr lang="zh-CN" altLang="en-US" dirty="0" smtClean="0"/>
-              <a:t>投影前的样本数据</a:t>
+              <a:t>二维数据投影到一维，</a:t>
             </a:r>
-            <a:endParaRPr lang="en-US" altLang="zh-CN" dirty="0" smtClean="0"/>
+            <a:r>
+              <a:rPr lang="zh-CN" altLang="en-US" sz="1200" b="0" i="0" kern="1200" dirty="0" smtClean="0">
+                <a:solidFill>
+                  <a:schemeClr val="tx1"/>
+                </a:solidFill>
+                <a:effectLst/>
+                <a:latin typeface="+mn-lt"/>
+                <a:ea typeface="+mn-ea"/>
+                <a:cs typeface="+mn-cs"/>
+              </a:rPr>
+              <a:t>右图能够更好地满足目标。</a:t>
+            </a:r>
+            <a:endParaRPr lang="zh-CN" altLang="en-US" dirty="0"/>
           </a:p>
         </p:txBody>
       </p:sp>
@@ -886,7 +1316,7 @@
           <a:p>
             <a:fld id="{1906FC78-C534-4F70-9640-0A9AE9E900C6}" type="slidenum">
               <a:rPr lang="zh-CN" altLang="en-US" smtClean="0"/>
-              <a:t>3</a:t>
+              <a:t>2</a:t>
             </a:fld>
             <a:endParaRPr lang="zh-CN" altLang="en-US"/>
           </a:p>
@@ -895,7 +1325,7 @@
     </p:spTree>
     <p:extLst>
       <p:ext uri="{BB962C8B-B14F-4D97-AF65-F5344CB8AC3E}">
-        <p14:creationId xmlns:p14="http://schemas.microsoft.com/office/powerpoint/2010/main" val="3481431233"/>
+        <p14:creationId xmlns:p14="http://schemas.microsoft.com/office/powerpoint/2010/main" val="2010773007"/>
       </p:ext>
     </p:extLst>
   </p:cSld>
@@ -951,26 +1381,9 @@
           <a:p>
             <a:r>
               <a:rPr lang="zh-CN" altLang="en-US" dirty="0" smtClean="0"/>
-              <a:t>投影后的样本数据</a:t>
+              <a:t>投影前的样本数据</a:t>
             </a:r>
             <a:endParaRPr lang="en-US" altLang="zh-CN" dirty="0" smtClean="0"/>
-          </a:p>
-          <a:p>
-            <a:r>
-              <a:rPr lang="en-US" altLang="zh-CN" dirty="0" smtClean="0"/>
-              <a:t>W</a:t>
-            </a:r>
-            <a:r>
-              <a:rPr lang="zh-CN" altLang="en-US" dirty="0" smtClean="0"/>
-              <a:t>是投影矩阵</a:t>
-            </a:r>
-            <a:endParaRPr lang="en-US" altLang="zh-CN" dirty="0" smtClean="0"/>
-          </a:p>
-          <a:p>
-            <a:r>
-              <a:rPr lang="zh-CN" altLang="en-US" dirty="0" smtClean="0"/>
-              <a:t>类间方差最大，类内方差最小。</a:t>
-            </a:r>
           </a:p>
         </p:txBody>
       </p:sp>
@@ -991,7 +1404,7 @@
           <a:p>
             <a:fld id="{1906FC78-C534-4F70-9640-0A9AE9E900C6}" type="slidenum">
               <a:rPr lang="zh-CN" altLang="en-US" smtClean="0"/>
-              <a:t>4</a:t>
+              <a:t>3</a:t>
             </a:fld>
             <a:endParaRPr lang="zh-CN" altLang="en-US"/>
           </a:p>
@@ -1000,7 +1413,7 @@
     </p:spTree>
     <p:extLst>
       <p:ext uri="{BB962C8B-B14F-4D97-AF65-F5344CB8AC3E}">
-        <p14:creationId xmlns:p14="http://schemas.microsoft.com/office/powerpoint/2010/main" val="1114931511"/>
+        <p14:creationId xmlns:p14="http://schemas.microsoft.com/office/powerpoint/2010/main" val="3481431233"/>
       </p:ext>
     </p:extLst>
   </p:cSld>
@@ -1056,22 +1469,25 @@
           <a:p>
             <a:r>
               <a:rPr lang="zh-CN" altLang="en-US" dirty="0" smtClean="0"/>
-              <a:t>特征空间 类间方差最大，类内方差最小。</a:t>
+              <a:t>投影后的样本数据</a:t>
             </a:r>
             <a:endParaRPr lang="en-US" altLang="zh-CN" dirty="0" smtClean="0"/>
           </a:p>
           <a:p>
             <a:r>
-              <a:rPr lang="en-US" altLang="zh-CN" dirty="0" err="1" smtClean="0"/>
-              <a:t>diag</a:t>
-            </a:r>
-            <a:r>
               <a:rPr lang="en-US" altLang="zh-CN" dirty="0" smtClean="0"/>
-              <a:t> </a:t>
+              <a:t>W</a:t>
             </a:r>
             <a:r>
               <a:rPr lang="zh-CN" altLang="en-US" dirty="0" smtClean="0"/>
-              <a:t>为主对角元素乘积</a:t>
+              <a:t>是投影矩阵</a:t>
+            </a:r>
+            <a:endParaRPr lang="en-US" altLang="zh-CN" dirty="0" smtClean="0"/>
+          </a:p>
+          <a:p>
+            <a:r>
+              <a:rPr lang="zh-CN" altLang="en-US" dirty="0" smtClean="0"/>
+              <a:t>类间方差最大，类内方差最小。</a:t>
             </a:r>
           </a:p>
         </p:txBody>
@@ -1093,7 +1509,7 @@
           <a:p>
             <a:fld id="{1906FC78-C534-4F70-9640-0A9AE9E900C6}" type="slidenum">
               <a:rPr lang="zh-CN" altLang="en-US" smtClean="0"/>
-              <a:t>5</a:t>
+              <a:t>4</a:t>
             </a:fld>
             <a:endParaRPr lang="zh-CN" altLang="en-US"/>
           </a:p>
@@ -1102,7 +1518,7 @@
     </p:spTree>
     <p:extLst>
       <p:ext uri="{BB962C8B-B14F-4D97-AF65-F5344CB8AC3E}">
-        <p14:creationId xmlns:p14="http://schemas.microsoft.com/office/powerpoint/2010/main" val="1202451404"/>
+        <p14:creationId xmlns:p14="http://schemas.microsoft.com/office/powerpoint/2010/main" val="1114931511"/>
       </p:ext>
     </p:extLst>
   </p:cSld>
@@ -1158,19 +1574,23 @@
           <a:p>
             <a:r>
               <a:rPr lang="zh-CN" altLang="en-US" dirty="0" smtClean="0"/>
-              <a:t>每一项都是广义瑞利商</a:t>
+              <a:t>特征空间 类间方差最大，类内方差最小。</a:t>
             </a:r>
             <a:endParaRPr lang="en-US" altLang="zh-CN" dirty="0" smtClean="0"/>
           </a:p>
           <a:p>
             <a:r>
+              <a:rPr lang="en-US" altLang="zh-CN" dirty="0" err="1" smtClean="0"/>
+              <a:t>diag</a:t>
+            </a:r>
+            <a:r>
+              <a:rPr lang="en-US" altLang="zh-CN" dirty="0" smtClean="0"/>
+              <a:t> </a:t>
+            </a:r>
+            <a:r>
               <a:rPr lang="zh-CN" altLang="en-US" dirty="0" smtClean="0"/>
-              <a:t>优化广义瑞利即可</a:t>
+              <a:t>为主对角元素乘积</a:t>
             </a:r>
-            <a:endParaRPr lang="en-US" altLang="zh-CN" dirty="0" smtClean="0"/>
-          </a:p>
-          <a:p>
-            <a:endParaRPr lang="zh-CN" altLang="en-US" dirty="0" smtClean="0"/>
           </a:p>
         </p:txBody>
       </p:sp>
@@ -1191,7 +1611,7 @@
           <a:p>
             <a:fld id="{1906FC78-C534-4F70-9640-0A9AE9E900C6}" type="slidenum">
               <a:rPr lang="zh-CN" altLang="en-US" smtClean="0"/>
-              <a:t>6</a:t>
+              <a:t>5</a:t>
             </a:fld>
             <a:endParaRPr lang="zh-CN" altLang="en-US"/>
           </a:p>
@@ -1200,7 +1620,7 @@
     </p:spTree>
     <p:extLst>
       <p:ext uri="{BB962C8B-B14F-4D97-AF65-F5344CB8AC3E}">
-        <p14:creationId xmlns:p14="http://schemas.microsoft.com/office/powerpoint/2010/main" val="2404557180"/>
+        <p14:creationId xmlns:p14="http://schemas.microsoft.com/office/powerpoint/2010/main" val="1202451404"/>
       </p:ext>
     </p:extLst>
   </p:cSld>
@@ -1254,7 +1674,21 @@
           <a:bodyPr/>
           <a:lstStyle/>
           <a:p>
-            <a:endParaRPr lang="zh-CN" altLang="en-US" dirty="0"/>
+            <a:r>
+              <a:rPr lang="zh-CN" altLang="en-US" dirty="0" smtClean="0"/>
+              <a:t>每一项都是广义瑞利商</a:t>
+            </a:r>
+            <a:endParaRPr lang="en-US" altLang="zh-CN" dirty="0" smtClean="0"/>
+          </a:p>
+          <a:p>
+            <a:r>
+              <a:rPr lang="zh-CN" altLang="en-US" dirty="0" smtClean="0"/>
+              <a:t>优化广义瑞利即可</a:t>
+            </a:r>
+            <a:endParaRPr lang="en-US" altLang="zh-CN" dirty="0" smtClean="0"/>
+          </a:p>
+          <a:p>
+            <a:endParaRPr lang="zh-CN" altLang="en-US" dirty="0" smtClean="0"/>
           </a:p>
         </p:txBody>
       </p:sp>
@@ -1275,6 +1709,94 @@
           <a:p>
             <a:fld id="{1906FC78-C534-4F70-9640-0A9AE9E900C6}" type="slidenum">
               <a:rPr lang="zh-CN" altLang="en-US" smtClean="0"/>
+              <a:t>6</a:t>
+            </a:fld>
+            <a:endParaRPr lang="zh-CN" altLang="en-US"/>
+          </a:p>
+        </p:txBody>
+      </p:sp>
+    </p:spTree>
+    <p:extLst>
+      <p:ext uri="{BB962C8B-B14F-4D97-AF65-F5344CB8AC3E}">
+        <p14:creationId xmlns:p14="http://schemas.microsoft.com/office/powerpoint/2010/main" val="2404557180"/>
+      </p:ext>
+    </p:extLst>
+  </p:cSld>
+  <p:clrMapOvr>
+    <a:masterClrMapping/>
+  </p:clrMapOvr>
+</p:notes>
+</file>
+
+<file path=ppt/notesSlides/notesSlide7.xml><?xml version="1.0" encoding="utf-8"?>
+<p:notes xmlns:a="http://schemas.openxmlformats.org/drawingml/2006/main" xmlns:r="http://schemas.openxmlformats.org/officeDocument/2006/relationships" xmlns:p="http://schemas.openxmlformats.org/presentationml/2006/main">
+  <p:cSld>
+    <p:spTree>
+      <p:nvGrpSpPr>
+        <p:cNvPr id="1" name=""/>
+        <p:cNvGrpSpPr/>
+        <p:nvPr/>
+      </p:nvGrpSpPr>
+      <p:grpSpPr>
+        <a:xfrm>
+          <a:off x="0" y="0"/>
+          <a:ext cx="0" cy="0"/>
+          <a:chOff x="0" y="0"/>
+          <a:chExt cx="0" cy="0"/>
+        </a:xfrm>
+      </p:grpSpPr>
+      <p:sp>
+        <p:nvSpPr>
+          <p:cNvPr id="2" name="幻灯片图像占位符 1"/>
+          <p:cNvSpPr>
+            <a:spLocks noGrp="1" noRot="1" noChangeAspect="1"/>
+          </p:cNvSpPr>
+          <p:nvPr>
+            <p:ph type="sldImg"/>
+          </p:nvPr>
+        </p:nvSpPr>
+        <p:spPr/>
+      </p:sp>
+      <p:sp>
+        <p:nvSpPr>
+          <p:cNvPr id="3" name="备注占位符 2"/>
+          <p:cNvSpPr>
+            <a:spLocks noGrp="1"/>
+          </p:cNvSpPr>
+          <p:nvPr>
+            <p:ph type="body" idx="1"/>
+          </p:nvPr>
+        </p:nvSpPr>
+        <p:spPr/>
+        <p:txBody>
+          <a:bodyPr/>
+          <a:lstStyle/>
+          <a:p>
+            <a:r>
+              <a:rPr lang="zh-CN" altLang="en-US" dirty="0" smtClean="0"/>
+              <a:t>小样本问题</a:t>
+            </a:r>
+            <a:endParaRPr lang="zh-CN" altLang="en-US" dirty="0"/>
+          </a:p>
+        </p:txBody>
+      </p:sp>
+      <p:sp>
+        <p:nvSpPr>
+          <p:cNvPr id="4" name="灯片编号占位符 3"/>
+          <p:cNvSpPr>
+            <a:spLocks noGrp="1"/>
+          </p:cNvSpPr>
+          <p:nvPr>
+            <p:ph type="sldNum" sz="quarter" idx="10"/>
+          </p:nvPr>
+        </p:nvSpPr>
+        <p:spPr/>
+        <p:txBody>
+          <a:bodyPr/>
+          <a:lstStyle/>
+          <a:p>
+            <a:fld id="{1906FC78-C534-4F70-9640-0A9AE9E900C6}" type="slidenum">
+              <a:rPr lang="zh-CN" altLang="en-US" smtClean="0"/>
               <a:t>7</a:t>
             </a:fld>
             <a:endParaRPr lang="zh-CN" altLang="en-US"/>
@@ -1294,7 +1816,7 @@
 </p:notes>
 </file>
 
-<file path=ppt/notesSlides/notesSlide7.xml><?xml version="1.0" encoding="utf-8"?>
+<file path=ppt/notesSlides/notesSlide8.xml><?xml version="1.0" encoding="utf-8"?>
 <p:notes xmlns:a="http://schemas.openxmlformats.org/drawingml/2006/main" xmlns:r="http://schemas.openxmlformats.org/officeDocument/2006/relationships" xmlns:p="http://schemas.openxmlformats.org/presentationml/2006/main">
   <p:cSld>
     <p:spTree>
@@ -1571,7 +2093,7 @@
 </p:notes>
 </file>
 
-<file path=ppt/notesSlides/notesSlide8.xml><?xml version="1.0" encoding="utf-8"?>
+<file path=ppt/notesSlides/notesSlide9.xml><?xml version="1.0" encoding="utf-8"?>
 <p:notes xmlns:a="http://schemas.openxmlformats.org/drawingml/2006/main" xmlns:r="http://schemas.openxmlformats.org/officeDocument/2006/relationships" xmlns:p="http://schemas.openxmlformats.org/presentationml/2006/main">
   <p:cSld>
     <p:spTree>
@@ -1646,206 +2168,6 @@
     <p:extLst>
       <p:ext uri="{BB962C8B-B14F-4D97-AF65-F5344CB8AC3E}">
         <p14:creationId xmlns:p14="http://schemas.microsoft.com/office/powerpoint/2010/main" val="2229359722"/>
-      </p:ext>
-    </p:extLst>
-  </p:cSld>
-  <p:clrMapOvr>
-    <a:masterClrMapping/>
-  </p:clrMapOvr>
-</p:notes>
-</file>
-
-<file path=ppt/notesSlides/notesSlide9.xml><?xml version="1.0" encoding="utf-8"?>
-<p:notes xmlns:a="http://schemas.openxmlformats.org/drawingml/2006/main" xmlns:r="http://schemas.openxmlformats.org/officeDocument/2006/relationships" xmlns:p="http://schemas.openxmlformats.org/presentationml/2006/main">
-  <p:cSld>
-    <p:spTree>
-      <p:nvGrpSpPr>
-        <p:cNvPr id="1" name=""/>
-        <p:cNvGrpSpPr/>
-        <p:nvPr/>
-      </p:nvGrpSpPr>
-      <p:grpSpPr>
-        <a:xfrm>
-          <a:off x="0" y="0"/>
-          <a:ext cx="0" cy="0"/>
-          <a:chOff x="0" y="0"/>
-          <a:chExt cx="0" cy="0"/>
-        </a:xfrm>
-      </p:grpSpPr>
-      <p:sp>
-        <p:nvSpPr>
-          <p:cNvPr id="2" name="幻灯片图像占位符 1"/>
-          <p:cNvSpPr>
-            <a:spLocks noGrp="1" noRot="1" noChangeAspect="1"/>
-          </p:cNvSpPr>
-          <p:nvPr>
-            <p:ph type="sldImg"/>
-          </p:nvPr>
-        </p:nvSpPr>
-        <p:spPr/>
-      </p:sp>
-      <mc:AlternateContent xmlns:mc="http://schemas.openxmlformats.org/markup-compatibility/2006" xmlns:a14="http://schemas.microsoft.com/office/drawing/2010/main">
-        <mc:Choice Requires="a14">
-          <p:sp>
-            <p:nvSpPr>
-              <p:cNvPr id="3" name="备注占位符 2"/>
-              <p:cNvSpPr>
-                <a:spLocks noGrp="1"/>
-              </p:cNvSpPr>
-              <p:nvPr>
-                <p:ph type="body" idx="1"/>
-              </p:nvPr>
-            </p:nvSpPr>
-            <p:spPr/>
-            <p:txBody>
-              <a:bodyPr/>
-              <a:lstStyle/>
-              <a:p>
-                <a:r>
-                  <a:rPr lang="zh-CN" altLang="en-US" dirty="0" smtClean="0"/>
-                  <a:t>最终得到</a:t>
-                </a:r>
-                <a14:m>
-                  <m:oMath xmlns:m="http://schemas.openxmlformats.org/officeDocument/2006/math">
-                    <m:sSubSup>
-                      <m:sSubSupPr>
-                        <m:ctrlPr>
-                          <a:rPr lang="en-US" altLang="zh-CN" i="1" smtClean="0">
-                            <a:latin typeface="Cambria Math" panose="02040503050406030204" pitchFamily="18" charset="0"/>
-                          </a:rPr>
-                        </m:ctrlPr>
-                      </m:sSubSupPr>
-                      <m:e>
-                        <m:r>
-                          <m:rPr>
-                            <m:sty m:val="p"/>
-                          </m:rPr>
-                          <a:rPr lang="en-US" altLang="zh-CN" i="1">
-                            <a:latin typeface="Cambria Math" panose="02040503050406030204" pitchFamily="18" charset="0"/>
-                          </a:rPr>
-                          <m:t>W</m:t>
-                        </m:r>
-                      </m:e>
-                      <m:sub>
-                        <m:r>
-                          <m:rPr>
-                            <m:sty m:val="p"/>
-                          </m:rPr>
-                          <a:rPr lang="en-US" altLang="zh-CN" i="1">
-                            <a:latin typeface="Cambria Math" panose="02040503050406030204" pitchFamily="18" charset="0"/>
-                          </a:rPr>
-                          <m:t>opt</m:t>
-                        </m:r>
-                      </m:sub>
-                      <m:sup>
-                        <m:r>
-                          <a:rPr lang="en-US" altLang="zh-CN" i="1">
-                            <a:latin typeface="Cambria Math" panose="02040503050406030204" pitchFamily="18" charset="0"/>
-                          </a:rPr>
-                          <m:t>𝑇</m:t>
-                        </m:r>
-                      </m:sup>
-                    </m:sSubSup>
-                  </m:oMath>
-                </a14:m>
-                <a:endParaRPr lang="en-US" altLang="zh-CN" dirty="0" smtClean="0"/>
-              </a:p>
-              <a:p>
-                <a:r>
-                  <a:rPr lang="en-US" altLang="zh-CN" dirty="0" smtClean="0"/>
-                  <a:t>n</a:t>
-                </a:r>
-                <a:r>
-                  <a:rPr lang="en-US" altLang="zh-CN" baseline="0" dirty="0" smtClean="0"/>
-                  <a:t> to N-c to c-1</a:t>
-                </a:r>
-                <a:endParaRPr lang="zh-CN" altLang="en-US" dirty="0"/>
-              </a:p>
-            </p:txBody>
-          </p:sp>
-        </mc:Choice>
-        <mc:Fallback xmlns="">
-          <p:sp>
-            <p:nvSpPr>
-              <p:cNvPr id="3" name="备注占位符 2"/>
-              <p:cNvSpPr>
-                <a:spLocks noGrp="1"/>
-              </p:cNvSpPr>
-              <p:nvPr>
-                <p:ph type="body" idx="1"/>
-              </p:nvPr>
-            </p:nvSpPr>
-            <p:spPr/>
-            <p:txBody>
-              <a:bodyPr/>
-              <a:lstStyle/>
-              <a:p>
-                <a:r>
-                  <a:rPr lang="zh-CN" altLang="en-US" dirty="0" smtClean="0"/>
-                  <a:t>最终得到</a:t>
-                </a:r>
-                <a:r>
-                  <a:rPr lang="en-US" altLang="zh-CN" i="0">
-                    <a:latin typeface="Cambria Math" panose="02040503050406030204" pitchFamily="18" charset="0"/>
-                  </a:rPr>
-                  <a:t>W</a:t>
-                </a:r>
-                <a:r>
-                  <a:rPr lang="en-US" altLang="zh-CN" i="0" smtClean="0">
-                    <a:latin typeface="Cambria Math" panose="02040503050406030204" pitchFamily="18" charset="0"/>
-                  </a:rPr>
-                  <a:t>_</a:t>
-                </a:r>
-                <a:r>
-                  <a:rPr lang="en-US" altLang="zh-CN" i="0">
-                    <a:latin typeface="Cambria Math" panose="02040503050406030204" pitchFamily="18" charset="0"/>
-                  </a:rPr>
-                  <a:t>opt^𝑇</a:t>
-                </a:r>
-                <a:endParaRPr lang="en-US" altLang="zh-CN" dirty="0" smtClean="0"/>
-              </a:p>
-              <a:p>
-                <a:r>
-                  <a:rPr lang="en-US" altLang="zh-CN" dirty="0" smtClean="0"/>
-                  <a:t>n</a:t>
-                </a:r>
-                <a:r>
-                  <a:rPr lang="en-US" altLang="zh-CN" baseline="0" dirty="0" smtClean="0"/>
-                  <a:t> to N-c to c-1</a:t>
-                </a:r>
-                <a:endParaRPr lang="zh-CN" altLang="en-US" dirty="0"/>
-              </a:p>
-            </p:txBody>
-          </p:sp>
-        </mc:Fallback>
-      </mc:AlternateContent>
-      <p:sp>
-        <p:nvSpPr>
-          <p:cNvPr id="4" name="灯片编号占位符 3"/>
-          <p:cNvSpPr>
-            <a:spLocks noGrp="1"/>
-          </p:cNvSpPr>
-          <p:nvPr>
-            <p:ph type="sldNum" sz="quarter" idx="10"/>
-          </p:nvPr>
-        </p:nvSpPr>
-        <p:spPr/>
-        <p:txBody>
-          <a:bodyPr/>
-          <a:lstStyle/>
-          <a:p>
-            <a:fld id="{1906FC78-C534-4F70-9640-0A9AE9E900C6}" type="slidenum">
-              <a:rPr lang="zh-CN" altLang="en-US" smtClean="0"/>
-              <a:t>10</a:t>
-            </a:fld>
-            <a:endParaRPr lang="zh-CN" altLang="en-US"/>
-          </a:p>
-        </p:txBody>
-      </p:sp>
-    </p:spTree>
-    <p:extLst>
-      <p:ext uri="{BB962C8B-B14F-4D97-AF65-F5344CB8AC3E}">
-        <p14:creationId xmlns:p14="http://schemas.microsoft.com/office/powerpoint/2010/main" val="3725770565"/>
       </p:ext>
     </p:extLst>
   </p:cSld>
@@ -1986,7 +2308,7 @@
           <a:p>
             <a:fld id="{48DE9D58-8812-4121-9A2B-265BF9F7328E}" type="datetimeFigureOut">
               <a:rPr lang="zh-CN" altLang="en-US" smtClean="0"/>
-              <a:t>2020/5/13</a:t>
+              <a:t>2020/6/2</a:t>
             </a:fld>
             <a:endParaRPr lang="zh-CN" altLang="en-US"/>
           </a:p>
@@ -2156,7 +2478,7 @@
           <a:p>
             <a:fld id="{48DE9D58-8812-4121-9A2B-265BF9F7328E}" type="datetimeFigureOut">
               <a:rPr lang="zh-CN" altLang="en-US" smtClean="0"/>
-              <a:t>2020/5/13</a:t>
+              <a:t>2020/6/2</a:t>
             </a:fld>
             <a:endParaRPr lang="zh-CN" altLang="en-US"/>
           </a:p>
@@ -2336,7 +2658,7 @@
           <a:p>
             <a:fld id="{48DE9D58-8812-4121-9A2B-265BF9F7328E}" type="datetimeFigureOut">
               <a:rPr lang="zh-CN" altLang="en-US" smtClean="0"/>
-              <a:t>2020/5/13</a:t>
+              <a:t>2020/6/2</a:t>
             </a:fld>
             <a:endParaRPr lang="zh-CN" altLang="en-US"/>
           </a:p>
@@ -2506,7 +2828,7 @@
           <a:p>
             <a:fld id="{48DE9D58-8812-4121-9A2B-265BF9F7328E}" type="datetimeFigureOut">
               <a:rPr lang="zh-CN" altLang="en-US" smtClean="0"/>
-              <a:t>2020/5/13</a:t>
+              <a:t>2020/6/2</a:t>
             </a:fld>
             <a:endParaRPr lang="zh-CN" altLang="en-US"/>
           </a:p>
@@ -2752,7 +3074,7 @@
           <a:p>
             <a:fld id="{48DE9D58-8812-4121-9A2B-265BF9F7328E}" type="datetimeFigureOut">
               <a:rPr lang="zh-CN" altLang="en-US" smtClean="0"/>
-              <a:t>2020/5/13</a:t>
+              <a:t>2020/6/2</a:t>
             </a:fld>
             <a:endParaRPr lang="zh-CN" altLang="en-US"/>
           </a:p>
@@ -2984,7 +3306,7 @@
           <a:p>
             <a:fld id="{48DE9D58-8812-4121-9A2B-265BF9F7328E}" type="datetimeFigureOut">
               <a:rPr lang="zh-CN" altLang="en-US" smtClean="0"/>
-              <a:t>2020/5/13</a:t>
+              <a:t>2020/6/2</a:t>
             </a:fld>
             <a:endParaRPr lang="zh-CN" altLang="en-US"/>
           </a:p>
@@ -3351,7 +3673,7 @@
           <a:p>
             <a:fld id="{48DE9D58-8812-4121-9A2B-265BF9F7328E}" type="datetimeFigureOut">
               <a:rPr lang="zh-CN" altLang="en-US" smtClean="0"/>
-              <a:t>2020/5/13</a:t>
+              <a:t>2020/6/2</a:t>
             </a:fld>
             <a:endParaRPr lang="zh-CN" altLang="en-US"/>
           </a:p>
@@ -3469,7 +3791,7 @@
           <a:p>
             <a:fld id="{48DE9D58-8812-4121-9A2B-265BF9F7328E}" type="datetimeFigureOut">
               <a:rPr lang="zh-CN" altLang="en-US" smtClean="0"/>
-              <a:t>2020/5/13</a:t>
+              <a:t>2020/6/2</a:t>
             </a:fld>
             <a:endParaRPr lang="zh-CN" altLang="en-US"/>
           </a:p>
@@ -3564,7 +3886,7 @@
           <a:p>
             <a:fld id="{48DE9D58-8812-4121-9A2B-265BF9F7328E}" type="datetimeFigureOut">
               <a:rPr lang="zh-CN" altLang="en-US" smtClean="0"/>
-              <a:t>2020/5/13</a:t>
+              <a:t>2020/6/2</a:t>
             </a:fld>
             <a:endParaRPr lang="zh-CN" altLang="en-US"/>
           </a:p>
@@ -3841,7 +4163,7 @@
           <a:p>
             <a:fld id="{48DE9D58-8812-4121-9A2B-265BF9F7328E}" type="datetimeFigureOut">
               <a:rPr lang="zh-CN" altLang="en-US" smtClean="0"/>
-              <a:t>2020/5/13</a:t>
+              <a:t>2020/6/2</a:t>
             </a:fld>
             <a:endParaRPr lang="zh-CN" altLang="en-US"/>
           </a:p>
@@ -4094,7 +4416,7 @@
           <a:p>
             <a:fld id="{48DE9D58-8812-4121-9A2B-265BF9F7328E}" type="datetimeFigureOut">
               <a:rPr lang="zh-CN" altLang="en-US" smtClean="0"/>
-              <a:t>2020/5/13</a:t>
+              <a:t>2020/6/2</a:t>
             </a:fld>
             <a:endParaRPr lang="zh-CN" altLang="en-US"/>
           </a:p>
@@ -4307,7 +4629,7 @@
           <a:p>
             <a:fld id="{48DE9D58-8812-4121-9A2B-265BF9F7328E}" type="datetimeFigureOut">
               <a:rPr lang="zh-CN" altLang="en-US" smtClean="0"/>
-              <a:t>2020/5/13</a:t>
+              <a:t>2020/6/2</a:t>
             </a:fld>
             <a:endParaRPr lang="zh-CN" altLang="en-US"/>
           </a:p>
@@ -6247,6 +6569,13 @@
   <p:clrMapOvr>
     <a:masterClrMapping/>
   </p:clrMapOvr>
+  <p:timing>
+    <p:tnLst>
+      <p:par>
+        <p:cTn id="1" dur="indefinite" restart="never" nodeType="tmRoot"/>
+      </p:par>
+    </p:tnLst>
+  </p:timing>
 </p:sld>
 </file>
 
@@ -6290,8 +6619,8 @@
           </a:p>
         </p:txBody>
       </p:sp>
-      <mc:AlternateContent xmlns:mc="http://schemas.openxmlformats.org/markup-compatibility/2006">
-        <mc:Choice xmlns:a14="http://schemas.microsoft.com/office/drawing/2010/main" Requires="a14">
+      <mc:AlternateContent xmlns:mc="http://schemas.openxmlformats.org/markup-compatibility/2006" xmlns:a14="http://schemas.microsoft.com/office/drawing/2010/main">
+        <mc:Choice Requires="a14">
           <p:sp>
             <p:nvSpPr>
               <p:cNvPr id="3" name="内容占位符 2"/>
@@ -6398,11 +6727,7 @@
               <a:p>
                 <a:r>
                   <a:rPr lang="zh-CN" altLang="en-US" dirty="0" smtClean="0"/>
-                  <a:t>特征</a:t>
-                </a:r>
-                <a:r>
-                  <a:rPr lang="zh-CN" altLang="en-US" dirty="0" smtClean="0"/>
-                  <a:t>空间维度</a:t>
+                  <a:t>特征空间维度</a:t>
                 </a:r>
                 <a:r>
                   <a:rPr lang="en-US" altLang="zh-CN" dirty="0" smtClean="0"/>
@@ -6837,7 +7162,7 @@
             </p:txBody>
           </p:sp>
         </mc:Choice>
-        <mc:Fallback>
+        <mc:Fallback xmlns="">
           <p:sp>
             <p:nvSpPr>
               <p:cNvPr id="3" name="内容占位符 2"/>
@@ -6881,6 +7206,13 @@
   <p:clrMapOvr>
     <a:masterClrMapping/>
   </p:clrMapOvr>
+  <p:timing>
+    <p:tnLst>
+      <p:par>
+        <p:cTn id="1" dur="indefinite" restart="never" nodeType="tmRoot"/>
+      </p:par>
+    </p:tnLst>
+  </p:timing>
 </p:sld>
 </file>
 
@@ -7052,11 +7384,7 @@
             </a:br>
             <a:r>
               <a:rPr lang="en-US" altLang="zh-CN" dirty="0"/>
-              <a:t>Intell. 19(7): 711-720 (1997)</a:t>
-            </a:r>
-            <a:r>
-              <a:rPr lang="en-US" altLang="zh-CN" dirty="0"/>
-              <a:t> </a:t>
+              <a:t>Intell. 19(7): 711-720 (1997) </a:t>
             </a:r>
             <a:br>
               <a:rPr lang="en-US" altLang="zh-CN" dirty="0"/>
@@ -7075,6 +7403,13 @@
   <p:clrMapOvr>
     <a:masterClrMapping/>
   </p:clrMapOvr>
+  <p:timing>
+    <p:tnLst>
+      <p:par>
+        <p:cTn id="1" dur="indefinite" restart="never" nodeType="tmRoot"/>
+      </p:par>
+    </p:tnLst>
+  </p:timing>
 </p:sld>
 </file>
 
@@ -7110,6 +7445,361 @@
           <a:bodyPr/>
           <a:lstStyle/>
           <a:p>
+            <a:r>
+              <a:rPr lang="zh-CN" altLang="en-US" dirty="0" smtClean="0"/>
+              <a:t>实验效果</a:t>
+            </a:r>
+            <a:endParaRPr lang="zh-CN" altLang="en-US" dirty="0"/>
+          </a:p>
+        </p:txBody>
+      </p:sp>
+      <mc:AlternateContent xmlns:mc="http://schemas.openxmlformats.org/markup-compatibility/2006" xmlns:a14="http://schemas.microsoft.com/office/drawing/2010/main">
+        <mc:Choice Requires="a14">
+          <p:sp>
+            <p:nvSpPr>
+              <p:cNvPr id="3" name="内容占位符 2"/>
+              <p:cNvSpPr>
+                <a:spLocks noGrp="1"/>
+              </p:cNvSpPr>
+              <p:nvPr>
+                <p:ph idx="1"/>
+              </p:nvPr>
+            </p:nvSpPr>
+            <p:spPr>
+              <a:xfrm>
+                <a:off x="838199" y="1825625"/>
+                <a:ext cx="4320209" cy="4351338"/>
+              </a:xfrm>
+            </p:spPr>
+            <p:txBody>
+              <a:bodyPr/>
+              <a:lstStyle/>
+              <a:p>
+                <a:r>
+                  <a:rPr lang="zh-CN" altLang="en-US" dirty="0" smtClean="0"/>
+                  <a:t>为了解决</a:t>
+                </a:r>
+                <a14:m>
+                  <m:oMath xmlns:m="http://schemas.openxmlformats.org/officeDocument/2006/math">
+                    <m:sSub>
+                      <m:sSubPr>
+                        <m:ctrlPr>
+                          <a:rPr lang="en-US" altLang="zh-CN" i="1">
+                            <a:latin typeface="Cambria Math" panose="02040503050406030204" pitchFamily="18" charset="0"/>
+                          </a:rPr>
+                        </m:ctrlPr>
+                      </m:sSubPr>
+                      <m:e>
+                        <m:r>
+                          <m:rPr>
+                            <m:sty m:val="p"/>
+                          </m:rPr>
+                          <a:rPr lang="en-US" altLang="zh-CN" i="1">
+                            <a:latin typeface="Cambria Math" panose="02040503050406030204" pitchFamily="18" charset="0"/>
+                          </a:rPr>
+                          <m:t>S</m:t>
+                        </m:r>
+                      </m:e>
+                      <m:sub>
+                        <m:r>
+                          <m:rPr>
+                            <m:sty m:val="p"/>
+                          </m:rPr>
+                          <a:rPr lang="en-US" altLang="zh-CN" i="1">
+                            <a:latin typeface="Cambria Math" panose="02040503050406030204" pitchFamily="18" charset="0"/>
+                          </a:rPr>
+                          <m:t>W</m:t>
+                        </m:r>
+                      </m:sub>
+                    </m:sSub>
+                  </m:oMath>
+                </a14:m>
+                <a:r>
+                  <a:rPr lang="zh-CN" altLang="en-US" dirty="0" smtClean="0"/>
+                  <a:t>非奇异的问题，先用</a:t>
+                </a:r>
+                <a:r>
+                  <a:rPr lang="en-US" altLang="zh-CN" dirty="0" smtClean="0"/>
+                  <a:t>PCA</a:t>
+                </a:r>
+                <a:r>
+                  <a:rPr lang="zh-CN" altLang="en-US" dirty="0" smtClean="0"/>
+                  <a:t>降维</a:t>
+                </a:r>
+                <a:endParaRPr lang="en-US" altLang="zh-CN" dirty="0" smtClean="0"/>
+              </a:p>
+              <a:p>
+                <a:r>
+                  <a:rPr lang="zh-CN" altLang="en-US" dirty="0" smtClean="0"/>
+                  <a:t>设置不同的</a:t>
+                </a:r>
+                <a:r>
+                  <a:rPr lang="en-US" altLang="zh-CN" dirty="0" smtClean="0"/>
+                  <a:t>PCA</a:t>
+                </a:r>
+                <a:r>
+                  <a:rPr lang="zh-CN" altLang="en-US" dirty="0" smtClean="0"/>
+                  <a:t>降维维度，观察最优的</a:t>
+                </a:r>
+                <a:r>
+                  <a:rPr lang="en-US" altLang="zh-CN" dirty="0" smtClean="0"/>
+                  <a:t>PCA</a:t>
+                </a:r>
+                <a:r>
+                  <a:rPr lang="zh-CN" altLang="en-US" dirty="0"/>
+                  <a:t>降维</a:t>
+                </a:r>
+                <a:r>
+                  <a:rPr lang="zh-CN" altLang="en-US" dirty="0" smtClean="0"/>
+                  <a:t>维度</a:t>
+                </a:r>
+                <a:endParaRPr lang="en-US" altLang="zh-CN" dirty="0" smtClean="0"/>
+              </a:p>
+              <a:p>
+                <a:r>
+                  <a:rPr lang="en-US" altLang="zh-CN" dirty="0" smtClean="0"/>
+                  <a:t>FLD</a:t>
+                </a:r>
+                <a:r>
+                  <a:rPr lang="zh-CN" altLang="en-US" dirty="0" smtClean="0"/>
+                  <a:t>在</a:t>
+                </a:r>
+                <a:r>
+                  <a:rPr lang="en-US" altLang="zh-CN" dirty="0" smtClean="0"/>
+                  <a:t>PCA</a:t>
+                </a:r>
+                <a:r>
+                  <a:rPr lang="zh-CN" altLang="en-US" dirty="0" smtClean="0"/>
+                  <a:t>降维基础上，统一降到</a:t>
+                </a:r>
+                <a:r>
+                  <a:rPr lang="en-US" altLang="zh-CN" dirty="0" smtClean="0"/>
+                  <a:t>14</a:t>
+                </a:r>
+                <a:r>
+                  <a:rPr lang="zh-CN" altLang="en-US" dirty="0" smtClean="0"/>
+                  <a:t>维（</a:t>
+                </a:r>
+                <a:r>
+                  <a:rPr lang="en-US" altLang="zh-CN" dirty="0" smtClean="0"/>
+                  <a:t>c-1</a:t>
+                </a:r>
+                <a:r>
+                  <a:rPr lang="zh-CN" altLang="en-US" dirty="0" smtClean="0"/>
+                  <a:t>）</a:t>
+                </a:r>
+                <a:endParaRPr lang="en-US" altLang="zh-CN" dirty="0" smtClean="0"/>
+              </a:p>
+              <a:p>
+                <a:r>
+                  <a:rPr lang="zh-CN" altLang="en-US" dirty="0" smtClean="0"/>
+                  <a:t>数据集：</a:t>
+                </a:r>
+                <a:r>
+                  <a:rPr lang="en-US" altLang="zh-CN" dirty="0" smtClean="0"/>
+                  <a:t>Yale database</a:t>
+                </a:r>
+              </a:p>
+              <a:p>
+                <a:r>
+                  <a:rPr lang="zh-CN" altLang="en-US" dirty="0"/>
+                  <a:t>使用留一法进行验证</a:t>
+                </a:r>
+                <a:endParaRPr lang="en-US" altLang="zh-CN" dirty="0"/>
+              </a:p>
+              <a:p>
+                <a:r>
+                  <a:rPr lang="zh-CN" altLang="en-US" dirty="0"/>
+                  <a:t>衡量标准：准确率</a:t>
+                </a:r>
+                <a:endParaRPr lang="en-US" altLang="zh-CN" dirty="0"/>
+              </a:p>
+              <a:p>
+                <a:endParaRPr lang="zh-CN" altLang="en-US" dirty="0"/>
+              </a:p>
+            </p:txBody>
+          </p:sp>
+        </mc:Choice>
+        <mc:Fallback xmlns="">
+          <p:sp>
+            <p:nvSpPr>
+              <p:cNvPr id="3" name="内容占位符 2"/>
+              <p:cNvSpPr>
+                <a:spLocks noGrp="1" noRot="1" noChangeAspect="1" noMove="1" noResize="1" noEditPoints="1" noAdjustHandles="1" noChangeArrowheads="1" noChangeShapeType="1" noTextEdit="1"/>
+              </p:cNvSpPr>
+              <p:nvPr>
+                <p:ph idx="1"/>
+              </p:nvPr>
+            </p:nvSpPr>
+            <p:spPr>
+              <a:xfrm>
+                <a:off x="838199" y="1825625"/>
+                <a:ext cx="4320209" cy="4351338"/>
+              </a:xfrm>
+              <a:blipFill>
+                <a:blip r:embed="rId3"/>
+                <a:stretch>
+                  <a:fillRect l="-2398" t="-2381" r="-9732"/>
+                </a:stretch>
+              </a:blipFill>
+            </p:spPr>
+            <p:txBody>
+              <a:bodyPr/>
+              <a:lstStyle/>
+              <a:p>
+                <a:r>
+                  <a:rPr lang="zh-CN" altLang="en-US">
+                    <a:noFill/>
+                  </a:rPr>
+                  <a:t> </a:t>
+                </a:r>
+              </a:p>
+            </p:txBody>
+          </p:sp>
+        </mc:Fallback>
+      </mc:AlternateContent>
+      <p:sp>
+        <p:nvSpPr>
+          <p:cNvPr id="7" name="文本框 6"/>
+          <p:cNvSpPr txBox="1"/>
+          <p:nvPr/>
+        </p:nvSpPr>
+        <p:spPr>
+          <a:xfrm>
+            <a:off x="6166884" y="5411972"/>
+            <a:ext cx="5103627" cy="646331"/>
+          </a:xfrm>
+          <a:prstGeom prst="rect">
+            <a:avLst/>
+          </a:prstGeom>
+          <a:noFill/>
+        </p:spPr>
+        <p:txBody>
+          <a:bodyPr wrap="square" rtlCol="0">
+            <a:spAutoFit/>
+          </a:bodyPr>
+          <a:lstStyle/>
+          <a:p>
+            <a:r>
+              <a:rPr lang="en-US" altLang="zh-CN" dirty="0" smtClean="0"/>
+              <a:t>60</a:t>
+            </a:r>
+            <a:r>
+              <a:rPr lang="zh-CN" altLang="en-US" dirty="0" smtClean="0"/>
+              <a:t>维效果最好：</a:t>
+            </a:r>
+            <a:r>
+              <a:rPr lang="en-US" altLang="zh-CN" dirty="0" smtClean="0"/>
+              <a:t>0.9818181818181818</a:t>
+            </a:r>
+          </a:p>
+          <a:p>
+            <a:r>
+              <a:rPr lang="en-US" altLang="zh-CN" dirty="0" smtClean="0"/>
+              <a:t> N-c</a:t>
+            </a:r>
+            <a:r>
+              <a:rPr lang="zh-CN" altLang="en-US" dirty="0" smtClean="0"/>
+              <a:t>：</a:t>
+            </a:r>
+            <a:r>
+              <a:rPr lang="en-US" altLang="zh-CN" dirty="0" smtClean="0"/>
+              <a:t>UserWarning</a:t>
+            </a:r>
+            <a:r>
+              <a:rPr lang="en-US" altLang="zh-CN" dirty="0"/>
+              <a:t>: Variables are collinear.</a:t>
+            </a:r>
+            <a:endParaRPr lang="zh-CN" altLang="en-US" dirty="0"/>
+          </a:p>
+        </p:txBody>
+      </p:sp>
+      <p:pic>
+        <p:nvPicPr>
+          <p:cNvPr id="10" name="图片 9"/>
+          <p:cNvPicPr>
+            <a:picLocks noChangeAspect="1"/>
+          </p:cNvPicPr>
+          <p:nvPr/>
+        </p:nvPicPr>
+        <p:blipFill>
+          <a:blip r:embed="rId4">
+            <a:extLst>
+              <a:ext uri="{28A0092B-C50C-407E-A947-70E740481C1C}">
+                <a14:useLocalDpi xmlns:a14="http://schemas.microsoft.com/office/drawing/2010/main" val="0"/>
+              </a:ext>
+            </a:extLst>
+          </a:blip>
+          <a:stretch>
+            <a:fillRect/>
+          </a:stretch>
+        </p:blipFill>
+        <p:spPr>
+          <a:xfrm>
+            <a:off x="5387840" y="1197253"/>
+            <a:ext cx="5792082" cy="3991435"/>
+          </a:xfrm>
+          <a:prstGeom prst="rect">
+            <a:avLst/>
+          </a:prstGeom>
+        </p:spPr>
+      </p:pic>
+    </p:spTree>
+    <p:extLst>
+      <p:ext uri="{BB962C8B-B14F-4D97-AF65-F5344CB8AC3E}">
+        <p14:creationId xmlns:p14="http://schemas.microsoft.com/office/powerpoint/2010/main" val="3740345853"/>
+      </p:ext>
+    </p:extLst>
+  </p:cSld>
+  <p:clrMapOvr>
+    <a:masterClrMapping/>
+  </p:clrMapOvr>
+  <p:timing>
+    <p:tnLst>
+      <p:par>
+        <p:cTn id="1" dur="indefinite" restart="never" nodeType="tmRoot"/>
+      </p:par>
+    </p:tnLst>
+  </p:timing>
+</p:sld>
+</file>
+
+<file path=ppt/slides/slide14.xml><?xml version="1.0" encoding="utf-8"?>
+<p:sld xmlns:a="http://schemas.openxmlformats.org/drawingml/2006/main" xmlns:r="http://schemas.openxmlformats.org/officeDocument/2006/relationships" xmlns:p="http://schemas.openxmlformats.org/presentationml/2006/main">
+  <p:cSld>
+    <p:spTree>
+      <p:nvGrpSpPr>
+        <p:cNvPr id="1" name=""/>
+        <p:cNvGrpSpPr/>
+        <p:nvPr/>
+      </p:nvGrpSpPr>
+      <p:grpSpPr>
+        <a:xfrm>
+          <a:off x="0" y="0"/>
+          <a:ext cx="0" cy="0"/>
+          <a:chOff x="0" y="0"/>
+          <a:chExt cx="0" cy="0"/>
+        </a:xfrm>
+      </p:grpSpPr>
+      <p:sp>
+        <p:nvSpPr>
+          <p:cNvPr id="2" name="标题 1"/>
+          <p:cNvSpPr>
+            <a:spLocks noGrp="1"/>
+          </p:cNvSpPr>
+          <p:nvPr>
+            <p:ph type="title"/>
+          </p:nvPr>
+        </p:nvSpPr>
+        <p:spPr/>
+        <p:txBody>
+          <a:bodyPr/>
+          <a:lstStyle/>
+          <a:p>
+            <a:r>
+              <a:rPr lang="zh-CN" altLang="en-US" dirty="0" smtClean="0"/>
+              <a:t>总结</a:t>
+            </a:r>
             <a:endParaRPr lang="zh-CN" altLang="en-US" dirty="0"/>
           </a:p>
         </p:txBody>
@@ -7129,20 +7819,103 @@
           <a:bodyPr/>
           <a:lstStyle/>
           <a:p>
-            <a:endParaRPr lang="zh-CN" altLang="en-US"/>
+            <a:r>
+              <a:rPr lang="zh-CN" altLang="en-US" dirty="0"/>
+              <a:t>在同</a:t>
+            </a:r>
+            <a:r>
+              <a:rPr lang="zh-CN" altLang="en-US" dirty="0" smtClean="0"/>
+              <a:t>一数据集</a:t>
+            </a:r>
+            <a:r>
+              <a:rPr lang="en-US" altLang="zh-CN" dirty="0" smtClean="0"/>
+              <a:t>Yale database </a:t>
+            </a:r>
+            <a:r>
+              <a:rPr lang="zh-CN" altLang="en-US" dirty="0" smtClean="0"/>
+              <a:t>上，</a:t>
+            </a:r>
+            <a:r>
+              <a:rPr lang="en-US" altLang="zh-CN" dirty="0" smtClean="0"/>
+              <a:t>fisherfaces</a:t>
+            </a:r>
+            <a:r>
+              <a:rPr lang="zh-CN" altLang="en-US" dirty="0" smtClean="0"/>
+              <a:t>的总体准确率在</a:t>
+            </a:r>
+            <a:r>
+              <a:rPr lang="en-US" altLang="zh-CN" dirty="0" smtClean="0"/>
+              <a:t>0.85</a:t>
+            </a:r>
+            <a:r>
+              <a:rPr lang="zh-CN" altLang="en-US" dirty="0" smtClean="0"/>
+              <a:t>以上，最高可达</a:t>
+            </a:r>
+            <a:r>
+              <a:rPr lang="en-US" altLang="zh-CN" dirty="0" smtClean="0"/>
+              <a:t>0.98</a:t>
+            </a:r>
+          </a:p>
+          <a:p>
+            <a:r>
+              <a:rPr lang="zh-CN" altLang="en-US" dirty="0" smtClean="0"/>
+              <a:t>而</a:t>
+            </a:r>
+            <a:r>
+              <a:rPr lang="en-US" altLang="zh-CN" dirty="0" smtClean="0"/>
+              <a:t>eigenfaces</a:t>
+            </a:r>
+            <a:r>
+              <a:rPr lang="zh-CN" altLang="en-US" dirty="0" smtClean="0"/>
+              <a:t>最高只有</a:t>
+            </a:r>
+            <a:r>
+              <a:rPr lang="en-US" altLang="zh-CN" dirty="0" smtClean="0"/>
+              <a:t>0.8</a:t>
+            </a:r>
+            <a:r>
+              <a:rPr lang="zh-CN" altLang="en-US" dirty="0" smtClean="0"/>
+              <a:t>左右</a:t>
+            </a:r>
+            <a:endParaRPr lang="en-US" altLang="zh-CN" dirty="0" smtClean="0"/>
+          </a:p>
+          <a:p>
+            <a:r>
+              <a:rPr lang="zh-CN" altLang="en-US" dirty="0" smtClean="0"/>
+              <a:t>我们可以认为</a:t>
+            </a:r>
+            <a:r>
+              <a:rPr lang="en-US" altLang="zh-CN" dirty="0" smtClean="0"/>
+              <a:t>fisherfaces</a:t>
+            </a:r>
+            <a:r>
+              <a:rPr lang="zh-CN" altLang="en-US" dirty="0" smtClean="0"/>
+              <a:t>方法更优，原因就在于它对光照以及表情变化不敏感。</a:t>
+            </a:r>
+            <a:endParaRPr lang="en-US" altLang="zh-CN" dirty="0" smtClean="0"/>
+          </a:p>
+          <a:p>
+            <a:endParaRPr lang="en-US" altLang="zh-CN" dirty="0" smtClean="0"/>
           </a:p>
         </p:txBody>
       </p:sp>
     </p:spTree>
     <p:extLst>
       <p:ext uri="{BB962C8B-B14F-4D97-AF65-F5344CB8AC3E}">
-        <p14:creationId xmlns:p14="http://schemas.microsoft.com/office/powerpoint/2010/main" val="1997930114"/>
+        <p14:creationId xmlns:p14="http://schemas.microsoft.com/office/powerpoint/2010/main" val="4002334944"/>
       </p:ext>
     </p:extLst>
   </p:cSld>
   <p:clrMapOvr>
     <a:masterClrMapping/>
   </p:clrMapOvr>
+  <p:timing>
+    <p:tnLst>
+      <p:par>
+        <p:cTn id="1" dur="indefinite" restart="never" nodeType="tmRoot"/>
+      </p:par>
+    </p:tnLst>
+  </p:timing>
 </p:sld>
 </file>
 
@@ -7221,7 +7994,7 @@
           <a:p>
             <a:r>
               <a:rPr lang="en-US" altLang="zh-CN" dirty="0" smtClean="0"/>
-              <a:t>LDA</a:t>
+              <a:t>FLD</a:t>
             </a:r>
             <a:r>
               <a:rPr lang="zh-CN" altLang="en-US" dirty="0" smtClean="0"/>
@@ -12718,7 +13491,7 @@
                 </a:r>
                 <a:r>
                   <a:rPr lang="en-US" altLang="zh-CN" dirty="0" smtClean="0"/>
-                  <a:t>LDA</a:t>
+                  <a:t>FLD</a:t>
                 </a:r>
                 <a:r>
                   <a:rPr lang="zh-CN" altLang="en-US" dirty="0" smtClean="0"/>
@@ -12742,7 +13515,7 @@
             </p:nvSpPr>
             <p:spPr>
               <a:blipFill>
-                <a:blip r:embed="rId4"/>
+                <a:blip r:embed="rId3"/>
                 <a:stretch>
                   <a:fillRect l="-1217"/>
                 </a:stretch>
@@ -12773,6 +13546,13 @@
   <p:clrMapOvr>
     <a:masterClrMapping/>
   </p:clrMapOvr>
+  <p:timing>
+    <p:tnLst>
+      <p:par>
+        <p:cTn id="1" dur="indefinite" restart="never" nodeType="tmRoot"/>
+      </p:par>
+    </p:tnLst>
+  </p:timing>
 </p:sld>
 </file>
 
@@ -12882,8 +13662,8 @@
           </p:sp>
         </mc:Fallback>
       </mc:AlternateContent>
-      <mc:AlternateContent xmlns:mc="http://schemas.openxmlformats.org/markup-compatibility/2006" xmlns:a14="http://schemas.microsoft.com/office/drawing/2010/main">
-        <mc:Choice Requires="a14">
+      <mc:AlternateContent xmlns:mc="http://schemas.openxmlformats.org/markup-compatibility/2006">
+        <mc:Choice xmlns:a14="http://schemas.microsoft.com/office/drawing/2010/main" Requires="a14">
           <p:sp>
             <p:nvSpPr>
               <p:cNvPr id="3" name="内容占位符 2"/>
@@ -13262,15 +14042,11 @@
                 </a:r>
                 <a:r>
                   <a:rPr lang="zh-CN" altLang="en-US" dirty="0" smtClean="0"/>
-                  <a:t>个求和项，</a:t>
-                </a:r>
-                <a:r>
-                  <a:rPr lang="en-US" altLang="zh-CN" dirty="0" smtClean="0"/>
-                  <a:t>,</a:t>
+                  <a:t>个求和项</a:t>
                 </a:r>
                 <a:r>
                   <a:rPr lang="zh-CN" altLang="en-US" dirty="0" smtClean="0"/>
-                  <a:t>每个</a:t>
+                  <a:t>，每个</a:t>
                 </a:r>
                 <a14:m>
                   <m:oMath xmlns:m="http://schemas.openxmlformats.org/officeDocument/2006/math">
@@ -13308,6 +14084,48 @@
                         </m:r>
                       </m:sub>
                     </m:sSub>
+                    <m:sSubSup>
+                      <m:sSubSupPr>
+                        <m:ctrlPr>
+                          <a:rPr lang="en-US" altLang="zh-CN" i="1" smtClean="0">
+                            <a:latin typeface="Cambria Math" panose="02040503050406030204" pitchFamily="18" charset="0"/>
+                          </a:rPr>
+                        </m:ctrlPr>
+                      </m:sSubSupPr>
+                      <m:e>
+                        <m:r>
+                          <m:rPr>
+                            <m:sty m:val="p"/>
+                          </m:rPr>
+                          <a:rPr lang="en-US" altLang="zh-CN" i="1">
+                            <a:latin typeface="Cambria Math" panose="02040503050406030204" pitchFamily="18" charset="0"/>
+                          </a:rPr>
+                          <m:t>A</m:t>
+                        </m:r>
+                      </m:e>
+                      <m:sub>
+                        <m:r>
+                          <m:rPr>
+                            <m:sty m:val="p"/>
+                          </m:rPr>
+                          <a:rPr lang="en-US" altLang="zh-CN" i="1">
+                            <a:latin typeface="Cambria Math" panose="02040503050406030204" pitchFamily="18" charset="0"/>
+                          </a:rPr>
+                          <m:t>j</m:t>
+                        </m:r>
+                      </m:sub>
+                      <m:sup>
+                        <m:r>
+                          <m:rPr>
+                            <m:sty m:val="p"/>
+                          </m:rPr>
+                          <a:rPr lang="en-US" altLang="zh-CN" i="1">
+                            <a:latin typeface="Cambria Math" panose="02040503050406030204" pitchFamily="18" charset="0"/>
+                          </a:rPr>
+                          <m:t>T</m:t>
+                        </m:r>
+                      </m:sup>
+                    </m:sSubSup>
                   </m:oMath>
                 </a14:m>
                 <a:r>
@@ -14355,7 +15173,7 @@
             </p:txBody>
           </p:sp>
         </mc:Choice>
-        <mc:Fallback xmlns="">
+        <mc:Fallback>
           <p:sp>
             <p:nvSpPr>
               <p:cNvPr id="3" name="内容占位符 2"/>
@@ -14368,7 +15186,7 @@
             </p:nvSpPr>
             <p:spPr>
               <a:blipFill>
-                <a:blip r:embed="rId7"/>
+                <a:blip r:embed="rId4"/>
                 <a:stretch>
                   <a:fillRect l="-1217"/>
                 </a:stretch>
@@ -14399,6 +15217,13 @@
   <p:clrMapOvr>
     <a:masterClrMapping/>
   </p:clrMapOvr>
+  <p:timing>
+    <p:tnLst>
+      <p:par>
+        <p:cTn id="1" dur="indefinite" restart="never" nodeType="tmRoot"/>
+      </p:par>
+    </p:tnLst>
+  </p:timing>
 </p:sld>
 </file>
 
@@ -16303,6 +17128,13 @@
   <p:clrMapOvr>
     <a:masterClrMapping/>
   </p:clrMapOvr>
+  <p:timing>
+    <p:tnLst>
+      <p:par>
+        <p:cTn id="1" dur="indefinite" restart="never" nodeType="tmRoot"/>
+      </p:par>
+    </p:tnLst>
+  </p:timing>
 </p:sld>
 </file>
 

</xml_diff>